<commit_message>
:wrench: Added BART and regressions
</commit_message>
<xml_diff>
--- a/Lab meeting presentation/2021-01-26.pptx
+++ b/Lab meeting presentation/2021-01-26.pptx
@@ -122,6 +122,11 @@
       </a:defRPr>
     </a:lvl9pPr>
   </p:defaultTextStyle>
+  <p:extLst>
+    <p:ext uri="{EFAFB233-063F-42B5-8137-9DF3F51BA10A}">
+      <p15:sldGuideLst xmlns:p15="http://schemas.microsoft.com/office/powerpoint/2012/main"/>
+    </p:ext>
+  </p:extLst>
 </p:presentation>
 </file>
 
@@ -207,7 +212,7 @@
           <a:p>
             <a:fld id="{9E7CABAD-5B81-40AE-B940-41BC0A675DB3}" type="datetimeFigureOut">
               <a:rPr lang="en-US" smtClean="0"/>
-              <a:t>1/22/2021</a:t>
+              <a:t>3/5/2021</a:t>
             </a:fld>
             <a:endParaRPr lang="en-US"/>
           </a:p>
@@ -859,6 +864,231 @@
 </p:notes>
 </file>
 
+<file path=ppt/notesSlides/notesSlide5.xml><?xml version="1.0" encoding="utf-8"?>
+<p:notes xmlns:a="http://schemas.openxmlformats.org/drawingml/2006/main" xmlns:r="http://schemas.openxmlformats.org/officeDocument/2006/relationships" xmlns:p="http://schemas.openxmlformats.org/presentationml/2006/main">
+  <p:cSld>
+    <p:spTree>
+      <p:nvGrpSpPr>
+        <p:cNvPr id="1" name=""/>
+        <p:cNvGrpSpPr/>
+        <p:nvPr/>
+      </p:nvGrpSpPr>
+      <p:grpSpPr>
+        <a:xfrm>
+          <a:off x="0" y="0"/>
+          <a:ext cx="0" cy="0"/>
+          <a:chOff x="0" y="0"/>
+          <a:chExt cx="0" cy="0"/>
+        </a:xfrm>
+      </p:grpSpPr>
+      <p:sp>
+        <p:nvSpPr>
+          <p:cNvPr id="2" name="Slide Image Placeholder 1"/>
+          <p:cNvSpPr>
+            <a:spLocks noGrp="1" noRot="1" noChangeAspect="1"/>
+          </p:cNvSpPr>
+          <p:nvPr>
+            <p:ph type="sldImg"/>
+          </p:nvPr>
+        </p:nvSpPr>
+        <p:spPr/>
+      </p:sp>
+      <p:sp>
+        <p:nvSpPr>
+          <p:cNvPr id="3" name="Notes Placeholder 2"/>
+          <p:cNvSpPr>
+            <a:spLocks noGrp="1"/>
+          </p:cNvSpPr>
+          <p:nvPr>
+            <p:ph type="body" idx="1"/>
+          </p:nvPr>
+        </p:nvSpPr>
+        <p:spPr/>
+        <p:txBody>
+          <a:bodyPr/>
+          <a:lstStyle/>
+          <a:p>
+            <a:pPr marL="0" marR="0" lvl="0" indent="0" algn="l" defTabSz="914400" rtl="0" eaLnBrk="1" fontAlgn="auto" latinLnBrk="0" hangingPunct="1">
+              <a:lnSpc>
+                <a:spcPct val="100000"/>
+              </a:lnSpc>
+              <a:spcBef>
+                <a:spcPts val="0"/>
+              </a:spcBef>
+              <a:spcAft>
+                <a:spcPts val="0"/>
+              </a:spcAft>
+              <a:buClrTx/>
+              <a:buSzTx/>
+              <a:buFontTx/>
+              <a:buNone/>
+              <a:tabLst/>
+              <a:defRPr/>
+            </a:pPr>
+            <a:r>
+              <a:rPr lang="fr-CA" dirty="0"/>
+              <a:t>Blue = 47% </a:t>
+            </a:r>
+            <a:r>
+              <a:rPr lang="fr-CA" dirty="0" err="1"/>
+              <a:t>hypoxic</a:t>
+            </a:r>
+            <a:r>
+              <a:rPr lang="fr-CA" dirty="0"/>
+              <a:t> prob</a:t>
+            </a:r>
+            <a:br>
+              <a:rPr lang="fr-CA" dirty="0"/>
+            </a:br>
+            <a:r>
+              <a:rPr lang="fr-CA" dirty="0"/>
+              <a:t>Brown = 33%</a:t>
+            </a:r>
+            <a:br>
+              <a:rPr lang="fr-CA" dirty="0"/>
+            </a:br>
+            <a:r>
+              <a:rPr lang="fr-CA" dirty="0"/>
+              <a:t>Green = 17,5%</a:t>
+            </a:r>
+            <a:br>
+              <a:rPr lang="fr-CA" dirty="0"/>
+            </a:br>
+            <a:r>
+              <a:rPr lang="fr-CA" dirty="0" err="1"/>
+              <a:t>Murky</a:t>
+            </a:r>
+            <a:r>
+              <a:rPr lang="fr-CA" dirty="0"/>
+              <a:t> = 9%</a:t>
+            </a:r>
+            <a:endParaRPr lang="en-US" dirty="0"/>
+          </a:p>
+          <a:p>
+            <a:endParaRPr lang="en-US" dirty="0"/>
+          </a:p>
+        </p:txBody>
+      </p:sp>
+      <p:sp>
+        <p:nvSpPr>
+          <p:cNvPr id="4" name="Slide Number Placeholder 3"/>
+          <p:cNvSpPr>
+            <a:spLocks noGrp="1"/>
+          </p:cNvSpPr>
+          <p:nvPr>
+            <p:ph type="sldNum" sz="quarter" idx="5"/>
+          </p:nvPr>
+        </p:nvSpPr>
+        <p:spPr/>
+        <p:txBody>
+          <a:bodyPr/>
+          <a:lstStyle/>
+          <a:p>
+            <a:fld id="{BDD95704-A586-4EB8-A1D9-34D21DD79F1B}" type="slidenum">
+              <a:rPr lang="en-US" smtClean="0"/>
+              <a:t>13</a:t>
+            </a:fld>
+            <a:endParaRPr lang="en-US"/>
+          </a:p>
+        </p:txBody>
+      </p:sp>
+    </p:spTree>
+    <p:extLst>
+      <p:ext uri="{BB962C8B-B14F-4D97-AF65-F5344CB8AC3E}">
+        <p14:creationId xmlns:p14="http://schemas.microsoft.com/office/powerpoint/2010/main" val="4130262560"/>
+      </p:ext>
+    </p:extLst>
+  </p:cSld>
+  <p:clrMapOvr>
+    <a:masterClrMapping/>
+  </p:clrMapOvr>
+</p:notes>
+</file>
+
+<file path=ppt/notesSlides/notesSlide6.xml><?xml version="1.0" encoding="utf-8"?>
+<p:notes xmlns:a="http://schemas.openxmlformats.org/drawingml/2006/main" xmlns:r="http://schemas.openxmlformats.org/officeDocument/2006/relationships" xmlns:p="http://schemas.openxmlformats.org/presentationml/2006/main">
+  <p:cSld>
+    <p:spTree>
+      <p:nvGrpSpPr>
+        <p:cNvPr id="1" name=""/>
+        <p:cNvGrpSpPr/>
+        <p:nvPr/>
+      </p:nvGrpSpPr>
+      <p:grpSpPr>
+        <a:xfrm>
+          <a:off x="0" y="0"/>
+          <a:ext cx="0" cy="0"/>
+          <a:chOff x="0" y="0"/>
+          <a:chExt cx="0" cy="0"/>
+        </a:xfrm>
+      </p:grpSpPr>
+      <p:sp>
+        <p:nvSpPr>
+          <p:cNvPr id="2" name="Slide Image Placeholder 1"/>
+          <p:cNvSpPr>
+            <a:spLocks noGrp="1" noRot="1" noChangeAspect="1"/>
+          </p:cNvSpPr>
+          <p:nvPr>
+            <p:ph type="sldImg"/>
+          </p:nvPr>
+        </p:nvSpPr>
+        <p:spPr/>
+      </p:sp>
+      <p:sp>
+        <p:nvSpPr>
+          <p:cNvPr id="3" name="Notes Placeholder 2"/>
+          <p:cNvSpPr>
+            <a:spLocks noGrp="1"/>
+          </p:cNvSpPr>
+          <p:nvPr>
+            <p:ph type="body" idx="1"/>
+          </p:nvPr>
+        </p:nvSpPr>
+        <p:spPr/>
+        <p:txBody>
+          <a:bodyPr/>
+          <a:lstStyle/>
+          <a:p>
+            <a:endParaRPr lang="en-US" dirty="0"/>
+          </a:p>
+        </p:txBody>
+      </p:sp>
+      <p:sp>
+        <p:nvSpPr>
+          <p:cNvPr id="4" name="Slide Number Placeholder 3"/>
+          <p:cNvSpPr>
+            <a:spLocks noGrp="1"/>
+          </p:cNvSpPr>
+          <p:nvPr>
+            <p:ph type="sldNum" sz="quarter" idx="5"/>
+          </p:nvPr>
+        </p:nvSpPr>
+        <p:spPr/>
+        <p:txBody>
+          <a:bodyPr/>
+          <a:lstStyle/>
+          <a:p>
+            <a:fld id="{BDD95704-A586-4EB8-A1D9-34D21DD79F1B}" type="slidenum">
+              <a:rPr lang="en-US" smtClean="0"/>
+              <a:t>14</a:t>
+            </a:fld>
+            <a:endParaRPr lang="en-US"/>
+          </a:p>
+        </p:txBody>
+      </p:sp>
+    </p:spTree>
+    <p:extLst>
+      <p:ext uri="{BB962C8B-B14F-4D97-AF65-F5344CB8AC3E}">
+        <p14:creationId xmlns:p14="http://schemas.microsoft.com/office/powerpoint/2010/main" val="2181034000"/>
+      </p:ext>
+    </p:extLst>
+  </p:cSld>
+  <p:clrMapOvr>
+    <a:masterClrMapping/>
+  </p:clrMapOvr>
+</p:notes>
+</file>
+
 <file path=ppt/slideLayouts/slideLayout1.xml><?xml version="1.0" encoding="utf-8"?>
 <p:sldLayout xmlns:a="http://schemas.openxmlformats.org/drawingml/2006/main" xmlns:r="http://schemas.openxmlformats.org/officeDocument/2006/relationships" xmlns:p="http://schemas.openxmlformats.org/presentationml/2006/main" type="title" preserve="1">
   <p:cSld name="Title Slide">
@@ -1006,7 +1236,7 @@
           <a:p>
             <a:fld id="{A3C0DDC4-370D-457D-9A27-6FE41179E5ED}" type="datetimeFigureOut">
               <a:rPr lang="en-US" smtClean="0"/>
-              <a:t>1/22/2021</a:t>
+              <a:t>3/5/2021</a:t>
             </a:fld>
             <a:endParaRPr lang="en-US"/>
           </a:p>
@@ -1204,7 +1434,7 @@
           <a:p>
             <a:fld id="{A3C0DDC4-370D-457D-9A27-6FE41179E5ED}" type="datetimeFigureOut">
               <a:rPr lang="en-US" smtClean="0"/>
-              <a:t>1/22/2021</a:t>
+              <a:t>3/5/2021</a:t>
             </a:fld>
             <a:endParaRPr lang="en-US"/>
           </a:p>
@@ -1412,7 +1642,7 @@
           <a:p>
             <a:fld id="{A3C0DDC4-370D-457D-9A27-6FE41179E5ED}" type="datetimeFigureOut">
               <a:rPr lang="en-US" smtClean="0"/>
-              <a:t>1/22/2021</a:t>
+              <a:t>3/5/2021</a:t>
             </a:fld>
             <a:endParaRPr lang="en-US"/>
           </a:p>
@@ -1610,7 +1840,7 @@
           <a:p>
             <a:fld id="{A3C0DDC4-370D-457D-9A27-6FE41179E5ED}" type="datetimeFigureOut">
               <a:rPr lang="en-US" smtClean="0"/>
-              <a:t>1/22/2021</a:t>
+              <a:t>3/5/2021</a:t>
             </a:fld>
             <a:endParaRPr lang="en-US"/>
           </a:p>
@@ -1885,7 +2115,7 @@
           <a:p>
             <a:fld id="{A3C0DDC4-370D-457D-9A27-6FE41179E5ED}" type="datetimeFigureOut">
               <a:rPr lang="en-US" smtClean="0"/>
-              <a:t>1/22/2021</a:t>
+              <a:t>3/5/2021</a:t>
             </a:fld>
             <a:endParaRPr lang="en-US"/>
           </a:p>
@@ -2150,7 +2380,7 @@
           <a:p>
             <a:fld id="{A3C0DDC4-370D-457D-9A27-6FE41179E5ED}" type="datetimeFigureOut">
               <a:rPr lang="en-US" smtClean="0"/>
-              <a:t>1/22/2021</a:t>
+              <a:t>3/5/2021</a:t>
             </a:fld>
             <a:endParaRPr lang="en-US"/>
           </a:p>
@@ -2562,7 +2792,7 @@
           <a:p>
             <a:fld id="{A3C0DDC4-370D-457D-9A27-6FE41179E5ED}" type="datetimeFigureOut">
               <a:rPr lang="en-US" smtClean="0"/>
-              <a:t>1/22/2021</a:t>
+              <a:t>3/5/2021</a:t>
             </a:fld>
             <a:endParaRPr lang="en-US"/>
           </a:p>
@@ -2703,7 +2933,7 @@
           <a:p>
             <a:fld id="{A3C0DDC4-370D-457D-9A27-6FE41179E5ED}" type="datetimeFigureOut">
               <a:rPr lang="en-US" smtClean="0"/>
-              <a:t>1/22/2021</a:t>
+              <a:t>3/5/2021</a:t>
             </a:fld>
             <a:endParaRPr lang="en-US"/>
           </a:p>
@@ -2816,7 +3046,7 @@
           <a:p>
             <a:fld id="{A3C0DDC4-370D-457D-9A27-6FE41179E5ED}" type="datetimeFigureOut">
               <a:rPr lang="en-US" smtClean="0"/>
-              <a:t>1/22/2021</a:t>
+              <a:t>3/5/2021</a:t>
             </a:fld>
             <a:endParaRPr lang="en-US"/>
           </a:p>
@@ -3127,7 +3357,7 @@
           <a:p>
             <a:fld id="{A3C0DDC4-370D-457D-9A27-6FE41179E5ED}" type="datetimeFigureOut">
               <a:rPr lang="en-US" smtClean="0"/>
-              <a:t>1/22/2021</a:t>
+              <a:t>3/5/2021</a:t>
             </a:fld>
             <a:endParaRPr lang="en-US"/>
           </a:p>
@@ -3415,7 +3645,7 @@
           <a:p>
             <a:fld id="{A3C0DDC4-370D-457D-9A27-6FE41179E5ED}" type="datetimeFigureOut">
               <a:rPr lang="en-US" smtClean="0"/>
-              <a:t>1/22/2021</a:t>
+              <a:t>3/5/2021</a:t>
             </a:fld>
             <a:endParaRPr lang="en-US"/>
           </a:p>
@@ -3656,7 +3886,7 @@
           <a:p>
             <a:fld id="{A3C0DDC4-370D-457D-9A27-6FE41179E5ED}" type="datetimeFigureOut">
               <a:rPr lang="en-US" smtClean="0"/>
-              <a:t>1/22/2021</a:t>
+              <a:t>3/5/2021</a:t>
             </a:fld>
             <a:endParaRPr lang="en-US"/>
           </a:p>
@@ -4763,7 +4993,7 @@
           <p:nvPr/>
         </p:nvPicPr>
         <p:blipFill>
-          <a:blip r:embed="rId2"/>
+          <a:blip r:embed="rId3"/>
           <a:stretch>
             <a:fillRect/>
           </a:stretch>
@@ -4793,7 +5023,7 @@
           <p:nvPr/>
         </p:nvPicPr>
         <p:blipFill>
-          <a:blip r:embed="rId3"/>
+          <a:blip r:embed="rId4"/>
           <a:stretch>
             <a:fillRect/>
           </a:stretch>
@@ -4880,7 +5110,7 @@
           </p:nvPr>
         </p:nvPicPr>
         <p:blipFill>
-          <a:blip r:embed="rId2"/>
+          <a:blip r:embed="rId3"/>
           <a:stretch>
             <a:fillRect/>
           </a:stretch>
@@ -4910,7 +5140,7 @@
           <p:nvPr/>
         </p:nvPicPr>
         <p:blipFill>
-          <a:blip r:embed="rId3"/>
+          <a:blip r:embed="rId4"/>
           <a:stretch>
             <a:fillRect/>
           </a:stretch>

</xml_diff>